<commit_message>
Modified Lab2 ppt and US source code
</commit_message>
<xml_diff>
--- a/ARC IoTDK Lab2.pptx
+++ b/ARC IoTDK Lab2.pptx
@@ -145,15 +145,15 @@
 </file>
 
 <file path=ppt/diagrams/colors1.xml><?xml version="1.0" encoding="utf-8"?>
-<dgm:colorsDef xmlns:dgm="http://schemas.openxmlformats.org/drawingml/2006/diagram" xmlns:a="http://schemas.openxmlformats.org/drawingml/2006/main" uniqueId="urn:microsoft.com/office/officeart/2005/8/colors/colorful1">
+<dgm:colorsDef xmlns:dgm="http://schemas.openxmlformats.org/drawingml/2006/diagram" xmlns:a="http://schemas.openxmlformats.org/drawingml/2006/main" uniqueId="urn:microsoft.com/office/officeart/2005/8/colors/colorful4">
   <dgm:title val=""/>
   <dgm:desc val=""/>
   <dgm:catLst>
-    <dgm:cat type="colorful" pri="10100"/>
+    <dgm:cat type="colorful" pri="10400"/>
   </dgm:catLst>
   <dgm:styleLbl name="node0">
     <dgm:fillClrLst meth="repeat">
-      <a:schemeClr val="accent1"/>
+      <a:schemeClr val="accent3"/>
     </dgm:fillClrLst>
     <dgm:linClrLst meth="repeat">
       <a:schemeClr val="lt1"/>
@@ -164,12 +164,9 @@
     <dgm:txEffectClrLst/>
   </dgm:styleLbl>
   <dgm:styleLbl name="node1">
-    <dgm:fillClrLst meth="repeat">
-      <a:schemeClr val="accent2"/>
-      <a:schemeClr val="accent3"/>
+    <dgm:fillClrLst>
       <a:schemeClr val="accent4"/>
       <a:schemeClr val="accent5"/>
-      <a:schemeClr val="accent6"/>
     </dgm:fillClrLst>
     <dgm:linClrLst meth="repeat">
       <a:schemeClr val="lt1"/>
@@ -180,19 +177,13 @@
     <dgm:txEffectClrLst/>
   </dgm:styleLbl>
   <dgm:styleLbl name="alignNode1">
-    <dgm:fillClrLst meth="repeat">
-      <a:schemeClr val="accent2"/>
-      <a:schemeClr val="accent3"/>
+    <dgm:fillClrLst>
       <a:schemeClr val="accent4"/>
       <a:schemeClr val="accent5"/>
-      <a:schemeClr val="accent6"/>
     </dgm:fillClrLst>
-    <dgm:linClrLst meth="repeat">
-      <a:schemeClr val="accent2"/>
-      <a:schemeClr val="accent3"/>
+    <dgm:linClrLst>
       <a:schemeClr val="accent4"/>
       <a:schemeClr val="accent5"/>
-      <a:schemeClr val="accent6"/>
     </dgm:linClrLst>
     <dgm:effectClrLst/>
     <dgm:txLinClrLst/>
@@ -200,12 +191,9 @@
     <dgm:txEffectClrLst/>
   </dgm:styleLbl>
   <dgm:styleLbl name="lnNode1">
-    <dgm:fillClrLst meth="repeat">
-      <a:schemeClr val="accent2"/>
-      <a:schemeClr val="accent3"/>
+    <dgm:fillClrLst>
       <a:schemeClr val="accent4"/>
       <a:schemeClr val="accent5"/>
-      <a:schemeClr val="accent6"/>
     </dgm:fillClrLst>
     <dgm:linClrLst meth="repeat">
       <a:schemeClr val="lt1"/>
@@ -216,20 +204,11 @@
     <dgm:txEffectClrLst/>
   </dgm:styleLbl>
   <dgm:styleLbl name="vennNode1">
-    <dgm:fillClrLst meth="repeat">
-      <a:schemeClr val="accent2">
-        <a:alpha val="50000"/>
-      </a:schemeClr>
-      <a:schemeClr val="accent3">
-        <a:alpha val="50000"/>
-      </a:schemeClr>
+    <dgm:fillClrLst>
       <a:schemeClr val="accent4">
         <a:alpha val="50000"/>
       </a:schemeClr>
       <a:schemeClr val="accent5">
-        <a:alpha val="50000"/>
-      </a:schemeClr>
-      <a:schemeClr val="accent6">
         <a:alpha val="50000"/>
       </a:schemeClr>
     </dgm:fillClrLst>
@@ -243,7 +222,7 @@
   </dgm:styleLbl>
   <dgm:styleLbl name="node2">
     <dgm:fillClrLst>
-      <a:schemeClr val="accent2"/>
+      <a:schemeClr val="accent5"/>
     </dgm:fillClrLst>
     <dgm:linClrLst meth="repeat">
       <a:schemeClr val="lt1"/>
@@ -255,7 +234,7 @@
   </dgm:styleLbl>
   <dgm:styleLbl name="node3">
     <dgm:fillClrLst>
-      <a:schemeClr val="accent3"/>
+      <a:schemeClr val="accent6"/>
     </dgm:fillClrLst>
     <dgm:linClrLst meth="repeat">
       <a:schemeClr val="lt1"/>
@@ -267,7 +246,7 @@
   </dgm:styleLbl>
   <dgm:styleLbl name="node4">
     <dgm:fillClrLst>
-      <a:schemeClr val="accent4"/>
+      <a:schemeClr val="accent1"/>
     </dgm:fillClrLst>
     <dgm:linClrLst meth="repeat">
       <a:schemeClr val="lt1"/>
@@ -278,20 +257,11 @@
     <dgm:txEffectClrLst/>
   </dgm:styleLbl>
   <dgm:styleLbl name="fgImgPlace1">
-    <dgm:fillClrLst meth="repeat">
-      <a:schemeClr val="accent2">
-        <a:tint val="50000"/>
-      </a:schemeClr>
-      <a:schemeClr val="accent3">
-        <a:tint val="50000"/>
-      </a:schemeClr>
+    <dgm:fillClrLst>
       <a:schemeClr val="accent4">
         <a:tint val="50000"/>
       </a:schemeClr>
       <a:schemeClr val="accent5">
-        <a:tint val="50000"/>
-      </a:schemeClr>
-      <a:schemeClr val="accent6">
         <a:tint val="50000"/>
       </a:schemeClr>
     </dgm:fillClrLst>
@@ -307,10 +277,10 @@
   </dgm:styleLbl>
   <dgm:styleLbl name="alignImgPlace1">
     <dgm:fillClrLst>
-      <a:schemeClr val="accent1">
+      <a:schemeClr val="accent4">
         <a:tint val="50000"/>
       </a:schemeClr>
-      <a:schemeClr val="accent2">
+      <a:schemeClr val="accent5">
         <a:tint val="20000"/>
       </a:schemeClr>
     </dgm:fillClrLst>
@@ -326,10 +296,10 @@
   </dgm:styleLbl>
   <dgm:styleLbl name="bgImgPlace1">
     <dgm:fillClrLst>
-      <a:schemeClr val="accent1">
+      <a:schemeClr val="accent4">
         <a:tint val="50000"/>
       </a:schemeClr>
-      <a:schemeClr val="accent2">
+      <a:schemeClr val="accent5">
         <a:tint val="20000"/>
       </a:schemeClr>
     </dgm:fillClrLst>
@@ -344,14 +314,11 @@
     <dgm:txEffectClrLst/>
   </dgm:styleLbl>
   <dgm:styleLbl name="sibTrans2D1">
-    <dgm:fillClrLst meth="repeat">
-      <a:schemeClr val="accent2"/>
-      <a:schemeClr val="accent3"/>
+    <dgm:fillClrLst>
       <a:schemeClr val="accent4"/>
       <a:schemeClr val="accent5"/>
-      <a:schemeClr val="accent6"/>
     </dgm:fillClrLst>
-    <dgm:linClrLst meth="cycle">
+    <dgm:linClrLst meth="repeat">
       <a:schemeClr val="lt1"/>
     </dgm:linClrLst>
     <dgm:effectClrLst/>
@@ -360,14 +327,11 @@
     <dgm:txEffectClrLst/>
   </dgm:styleLbl>
   <dgm:styleLbl name="fgSibTrans2D1">
-    <dgm:fillClrLst meth="repeat">
-      <a:schemeClr val="accent2"/>
-      <a:schemeClr val="accent3"/>
+    <dgm:fillClrLst>
       <a:schemeClr val="accent4"/>
       <a:schemeClr val="accent5"/>
-      <a:schemeClr val="accent6"/>
     </dgm:fillClrLst>
-    <dgm:linClrLst meth="cycle">
+    <dgm:linClrLst meth="repeat">
       <a:schemeClr val="lt1"/>
     </dgm:linClrLst>
     <dgm:effectClrLst/>
@@ -378,14 +342,11 @@
     <dgm:txEffectClrLst/>
   </dgm:styleLbl>
   <dgm:styleLbl name="bgSibTrans2D1">
-    <dgm:fillClrLst meth="repeat">
-      <a:schemeClr val="accent2"/>
-      <a:schemeClr val="accent3"/>
+    <dgm:fillClrLst>
       <a:schemeClr val="accent4"/>
       <a:schemeClr val="accent5"/>
-      <a:schemeClr val="accent6"/>
     </dgm:fillClrLst>
-    <dgm:linClrLst meth="cycle">
+    <dgm:linClrLst meth="repeat">
       <a:schemeClr val="lt1"/>
     </dgm:linClrLst>
     <dgm:effectClrLst/>
@@ -396,19 +357,10 @@
     <dgm:txEffectClrLst/>
   </dgm:styleLbl>
   <dgm:styleLbl name="sibTrans1D1">
-    <dgm:fillClrLst meth="repeat">
-      <a:schemeClr val="accent2"/>
-      <a:schemeClr val="accent3"/>
+    <dgm:fillClrLst/>
+    <dgm:linClrLst>
       <a:schemeClr val="accent4"/>
       <a:schemeClr val="accent5"/>
-      <a:schemeClr val="accent6"/>
-    </dgm:fillClrLst>
-    <dgm:linClrLst meth="repeat">
-      <a:schemeClr val="accent2"/>
-      <a:schemeClr val="accent3"/>
-      <a:schemeClr val="accent4"/>
-      <a:schemeClr val="accent5"/>
-      <a:schemeClr val="accent6"/>
     </dgm:linClrLst>
     <dgm:effectClrLst/>
     <dgm:txLinClrLst/>
@@ -419,10 +371,10 @@
   </dgm:styleLbl>
   <dgm:styleLbl name="callout">
     <dgm:fillClrLst meth="repeat">
-      <a:schemeClr val="accent2"/>
+      <a:schemeClr val="accent4"/>
     </dgm:fillClrLst>
     <dgm:linClrLst meth="repeat">
-      <a:schemeClr val="accent2">
+      <a:schemeClr val="accent4">
         <a:tint val="50000"/>
       </a:schemeClr>
     </dgm:linClrLst>
@@ -435,10 +387,12 @@
   </dgm:styleLbl>
   <dgm:styleLbl name="asst0">
     <dgm:fillClrLst meth="repeat">
-      <a:schemeClr val="accent1"/>
+      <a:schemeClr val="accent4"/>
     </dgm:fillClrLst>
     <dgm:linClrLst meth="repeat">
-      <a:schemeClr val="lt1"/>
+      <a:schemeClr val="lt1">
+        <a:shade val="80000"/>
+      </a:schemeClr>
     </dgm:linClrLst>
     <dgm:effectClrLst/>
     <dgm:txLinClrLst/>
@@ -447,10 +401,12 @@
   </dgm:styleLbl>
   <dgm:styleLbl name="asst1">
     <dgm:fillClrLst meth="repeat">
-      <a:schemeClr val="accent2"/>
+      <a:schemeClr val="accent5"/>
     </dgm:fillClrLst>
     <dgm:linClrLst meth="repeat">
-      <a:schemeClr val="lt1"/>
+      <a:schemeClr val="lt1">
+        <a:shade val="80000"/>
+      </a:schemeClr>
     </dgm:linClrLst>
     <dgm:effectClrLst/>
     <dgm:txLinClrLst/>
@@ -459,7 +415,7 @@
   </dgm:styleLbl>
   <dgm:styleLbl name="asst2">
     <dgm:fillClrLst>
-      <a:schemeClr val="accent3"/>
+      <a:schemeClr val="accent6"/>
     </dgm:fillClrLst>
     <dgm:linClrLst meth="repeat">
       <a:schemeClr val="lt1"/>
@@ -471,7 +427,7 @@
   </dgm:styleLbl>
   <dgm:styleLbl name="asst3">
     <dgm:fillClrLst>
-      <a:schemeClr val="accent4"/>
+      <a:schemeClr val="accent1"/>
     </dgm:fillClrLst>
     <dgm:linClrLst meth="repeat">
       <a:schemeClr val="lt1"/>
@@ -483,7 +439,7 @@
   </dgm:styleLbl>
   <dgm:styleLbl name="asst4">
     <dgm:fillClrLst>
-      <a:schemeClr val="accent5"/>
+      <a:schemeClr val="accent2"/>
     </dgm:fillClrLst>
     <dgm:linClrLst meth="repeat">
       <a:schemeClr val="lt1"/>
@@ -495,7 +451,7 @@
   </dgm:styleLbl>
   <dgm:styleLbl name="parChTrans2D1">
     <dgm:fillClrLst meth="repeat">
-      <a:schemeClr val="accent2"/>
+      <a:schemeClr val="accent4"/>
     </dgm:fillClrLst>
     <dgm:linClrLst meth="repeat">
       <a:schemeClr val="lt1"/>
@@ -509,7 +465,7 @@
   </dgm:styleLbl>
   <dgm:styleLbl name="parChTrans2D2">
     <dgm:fillClrLst meth="repeat">
-      <a:schemeClr val="accent3"/>
+      <a:schemeClr val="accent5"/>
     </dgm:fillClrLst>
     <dgm:linClrLst meth="repeat">
       <a:schemeClr val="lt1"/>
@@ -521,7 +477,7 @@
   </dgm:styleLbl>
   <dgm:styleLbl name="parChTrans2D3">
     <dgm:fillClrLst meth="repeat">
-      <a:schemeClr val="accent4"/>
+      <a:schemeClr val="accent5"/>
     </dgm:fillClrLst>
     <dgm:linClrLst meth="repeat">
       <a:schemeClr val="lt1"/>
@@ -533,7 +489,7 @@
   </dgm:styleLbl>
   <dgm:styleLbl name="parChTrans2D4">
     <dgm:fillClrLst meth="repeat">
-      <a:schemeClr val="accent5"/>
+      <a:schemeClr val="accent6"/>
     </dgm:fillClrLst>
     <dgm:linClrLst meth="repeat">
       <a:schemeClr val="lt1"/>
@@ -547,10 +503,10 @@
   </dgm:styleLbl>
   <dgm:styleLbl name="parChTrans1D1">
     <dgm:fillClrLst meth="repeat">
-      <a:schemeClr val="accent2"/>
+      <a:schemeClr val="accent4"/>
     </dgm:fillClrLst>
     <dgm:linClrLst meth="repeat">
-      <a:schemeClr val="accent1"/>
+      <a:schemeClr val="accent4"/>
     </dgm:linClrLst>
     <dgm:effectClrLst/>
     <dgm:txLinClrLst/>
@@ -561,12 +517,12 @@
   </dgm:styleLbl>
   <dgm:styleLbl name="parChTrans1D2">
     <dgm:fillClrLst meth="repeat">
-      <a:schemeClr val="accent3">
+      <a:schemeClr val="accent4">
         <a:tint val="90000"/>
       </a:schemeClr>
     </dgm:fillClrLst>
     <dgm:linClrLst meth="repeat">
-      <a:schemeClr val="accent2"/>
+      <a:schemeClr val="accent5"/>
     </dgm:linClrLst>
     <dgm:effectClrLst/>
     <dgm:txLinClrLst/>
@@ -582,7 +538,7 @@
       </a:schemeClr>
     </dgm:fillClrLst>
     <dgm:linClrLst meth="repeat">
-      <a:schemeClr val="accent3"/>
+      <a:schemeClr val="accent6"/>
     </dgm:linClrLst>
     <dgm:effectClrLst/>
     <dgm:txLinClrLst/>
@@ -593,12 +549,12 @@
   </dgm:styleLbl>
   <dgm:styleLbl name="parChTrans1D4">
     <dgm:fillClrLst meth="repeat">
-      <a:schemeClr val="accent5">
+      <a:schemeClr val="accent4">
         <a:tint val="50000"/>
       </a:schemeClr>
     </dgm:fillClrLst>
     <dgm:linClrLst meth="repeat">
-      <a:schemeClr val="accent4"/>
+      <a:schemeClr val="accent1"/>
     </dgm:linClrLst>
     <dgm:effectClrLst/>
     <dgm:txLinClrLst/>
@@ -613,12 +569,9 @@
         <a:alpha val="90000"/>
       </a:schemeClr>
     </dgm:fillClrLst>
-    <dgm:linClrLst meth="repeat">
-      <a:schemeClr val="accent2"/>
-      <a:schemeClr val="accent3"/>
+    <dgm:linClrLst>
       <a:schemeClr val="accent4"/>
       <a:schemeClr val="accent5"/>
-      <a:schemeClr val="accent6"/>
     </dgm:linClrLst>
     <dgm:effectClrLst/>
     <dgm:txLinClrLst/>
@@ -633,12 +586,9 @@
         <a:alpha val="90000"/>
       </a:schemeClr>
     </dgm:fillClrLst>
-    <dgm:linClrLst meth="repeat">
-      <a:schemeClr val="accent2"/>
-      <a:schemeClr val="accent3"/>
+    <dgm:linClrLst>
       <a:schemeClr val="accent4"/>
       <a:schemeClr val="accent5"/>
-      <a:schemeClr val="accent6"/>
     </dgm:linClrLst>
     <dgm:effectClrLst/>
     <dgm:txLinClrLst/>
@@ -653,12 +603,9 @@
         <a:alpha val="90000"/>
       </a:schemeClr>
     </dgm:fillClrLst>
-    <dgm:linClrLst meth="repeat">
-      <a:schemeClr val="accent2"/>
-      <a:schemeClr val="accent3"/>
+    <dgm:linClrLst>
       <a:schemeClr val="accent4"/>
       <a:schemeClr val="accent5"/>
-      <a:schemeClr val="accent6"/>
     </dgm:linClrLst>
     <dgm:effectClrLst/>
     <dgm:txLinClrLst/>
@@ -674,7 +621,7 @@
       </a:schemeClr>
     </dgm:fillClrLst>
     <dgm:linClrLst meth="repeat">
-      <a:schemeClr val="accent1"/>
+      <a:schemeClr val="accent4"/>
     </dgm:linClrLst>
     <dgm:effectClrLst/>
     <dgm:txLinClrLst/>
@@ -689,12 +636,9 @@
         <a:alpha val="90000"/>
       </a:schemeClr>
     </dgm:fillClrLst>
-    <dgm:linClrLst meth="repeat">
-      <a:schemeClr val="accent2"/>
-      <a:schemeClr val="accent3"/>
+    <dgm:linClrLst>
       <a:schemeClr val="accent4"/>
       <a:schemeClr val="accent5"/>
-      <a:schemeClr val="accent6"/>
     </dgm:linClrLst>
     <dgm:effectClrLst/>
     <dgm:txLinClrLst/>
@@ -707,12 +651,9 @@
     <dgm:fillClrLst meth="repeat">
       <a:schemeClr val="lt1"/>
     </dgm:fillClrLst>
-    <dgm:linClrLst meth="repeat">
-      <a:schemeClr val="accent2"/>
-      <a:schemeClr val="accent3"/>
+    <dgm:linClrLst>
       <a:schemeClr val="accent4"/>
       <a:schemeClr val="accent5"/>
-      <a:schemeClr val="accent6"/>
     </dgm:linClrLst>
     <dgm:effectClrLst/>
     <dgm:txLinClrLst/>
@@ -725,12 +666,9 @@
     <dgm:fillClrLst meth="repeat">
       <a:schemeClr val="lt1"/>
     </dgm:fillClrLst>
-    <dgm:linClrLst meth="repeat">
-      <a:schemeClr val="accent2"/>
-      <a:schemeClr val="accent3"/>
+    <dgm:linClrLst>
       <a:schemeClr val="accent4"/>
       <a:schemeClr val="accent5"/>
-      <a:schemeClr val="accent6"/>
     </dgm:linClrLst>
     <dgm:effectClrLst/>
     <dgm:txLinClrLst/>
@@ -743,12 +681,9 @@
     <dgm:fillClrLst meth="repeat">
       <a:schemeClr val="lt1"/>
     </dgm:fillClrLst>
-    <dgm:linClrLst meth="repeat">
-      <a:schemeClr val="accent2"/>
-      <a:schemeClr val="accent3"/>
+    <dgm:linClrLst>
       <a:schemeClr val="accent4"/>
       <a:schemeClr val="accent5"/>
-      <a:schemeClr val="accent6"/>
     </dgm:linClrLst>
     <dgm:effectClrLst/>
     <dgm:txLinClrLst/>
@@ -758,15 +693,7 @@
     <dgm:txEffectClrLst/>
   </dgm:styleLbl>
   <dgm:styleLbl name="fgAccFollowNode1">
-    <dgm:fillClrLst meth="repeat">
-      <a:schemeClr val="accent2">
-        <a:tint val="40000"/>
-        <a:alpha val="90000"/>
-      </a:schemeClr>
-      <a:schemeClr val="accent3">
-        <a:tint val="40000"/>
-        <a:alpha val="90000"/>
-      </a:schemeClr>
+    <dgm:fillClrLst>
       <a:schemeClr val="accent4">
         <a:tint val="40000"/>
         <a:alpha val="90000"/>
@@ -775,29 +702,13 @@
         <a:tint val="40000"/>
         <a:alpha val="90000"/>
       </a:schemeClr>
-      <a:schemeClr val="accent6">
-        <a:tint val="40000"/>
-        <a:alpha val="90000"/>
-      </a:schemeClr>
     </dgm:fillClrLst>
-    <dgm:linClrLst meth="repeat">
-      <a:schemeClr val="accent2">
-        <a:tint val="40000"/>
-        <a:alpha val="90000"/>
-      </a:schemeClr>
-      <a:schemeClr val="accent3">
-        <a:tint val="40000"/>
-        <a:alpha val="90000"/>
-      </a:schemeClr>
+    <dgm:linClrLst>
       <a:schemeClr val="accent4">
         <a:tint val="40000"/>
         <a:alpha val="90000"/>
       </a:schemeClr>
       <a:schemeClr val="accent5">
-        <a:tint val="40000"/>
-        <a:alpha val="90000"/>
-      </a:schemeClr>
-      <a:schemeClr val="accent6">
         <a:tint val="40000"/>
         <a:alpha val="90000"/>
       </a:schemeClr>
@@ -810,15 +721,7 @@
     <dgm:txEffectClrLst/>
   </dgm:styleLbl>
   <dgm:styleLbl name="alignAccFollowNode1">
-    <dgm:fillClrLst meth="repeat">
-      <a:schemeClr val="accent2">
-        <a:tint val="40000"/>
-        <a:alpha val="90000"/>
-      </a:schemeClr>
-      <a:schemeClr val="accent3">
-        <a:tint val="40000"/>
-        <a:alpha val="90000"/>
-      </a:schemeClr>
+    <dgm:fillClrLst>
       <a:schemeClr val="accent4">
         <a:tint val="40000"/>
         <a:alpha val="90000"/>
@@ -827,29 +730,13 @@
         <a:tint val="40000"/>
         <a:alpha val="90000"/>
       </a:schemeClr>
-      <a:schemeClr val="accent6">
-        <a:tint val="40000"/>
-        <a:alpha val="90000"/>
-      </a:schemeClr>
     </dgm:fillClrLst>
-    <dgm:linClrLst meth="repeat">
-      <a:schemeClr val="accent2">
-        <a:tint val="40000"/>
-        <a:alpha val="90000"/>
-      </a:schemeClr>
-      <a:schemeClr val="accent3">
-        <a:tint val="40000"/>
-        <a:alpha val="90000"/>
-      </a:schemeClr>
+    <dgm:linClrLst>
       <a:schemeClr val="accent4">
         <a:tint val="40000"/>
         <a:alpha val="90000"/>
       </a:schemeClr>
       <a:schemeClr val="accent5">
-        <a:tint val="40000"/>
-        <a:alpha val="90000"/>
-      </a:schemeClr>
-      <a:schemeClr val="accent6">
         <a:tint val="40000"/>
         <a:alpha val="90000"/>
       </a:schemeClr>
@@ -862,15 +749,7 @@
     <dgm:txEffectClrLst/>
   </dgm:styleLbl>
   <dgm:styleLbl name="bgAccFollowNode1">
-    <dgm:fillClrLst meth="repeat">
-      <a:schemeClr val="accent2">
-        <a:tint val="40000"/>
-        <a:alpha val="90000"/>
-      </a:schemeClr>
-      <a:schemeClr val="accent3">
-        <a:tint val="40000"/>
-        <a:alpha val="90000"/>
-      </a:schemeClr>
+    <dgm:fillClrLst>
       <a:schemeClr val="accent4">
         <a:tint val="40000"/>
         <a:alpha val="90000"/>
@@ -879,29 +758,13 @@
         <a:tint val="40000"/>
         <a:alpha val="90000"/>
       </a:schemeClr>
-      <a:schemeClr val="accent6">
-        <a:tint val="40000"/>
-        <a:alpha val="90000"/>
-      </a:schemeClr>
     </dgm:fillClrLst>
-    <dgm:linClrLst meth="repeat">
-      <a:schemeClr val="accent2">
-        <a:tint val="40000"/>
-        <a:alpha val="90000"/>
-      </a:schemeClr>
-      <a:schemeClr val="accent3">
-        <a:tint val="40000"/>
-        <a:alpha val="90000"/>
-      </a:schemeClr>
+    <dgm:linClrLst>
       <a:schemeClr val="accent4">
         <a:tint val="40000"/>
         <a:alpha val="90000"/>
       </a:schemeClr>
       <a:schemeClr val="accent5">
-        <a:tint val="40000"/>
-        <a:alpha val="90000"/>
-      </a:schemeClr>
-      <a:schemeClr val="accent6">
         <a:tint val="40000"/>
         <a:alpha val="90000"/>
       </a:schemeClr>
@@ -920,7 +783,7 @@
       </a:schemeClr>
     </dgm:fillClrLst>
     <dgm:linClrLst>
-      <a:schemeClr val="accent1"/>
+      <a:schemeClr val="accent3"/>
     </dgm:linClrLst>
     <dgm:effectClrLst/>
     <dgm:txLinClrLst/>
@@ -936,7 +799,7 @@
       </a:schemeClr>
     </dgm:fillClrLst>
     <dgm:linClrLst>
-      <a:schemeClr val="accent2"/>
+      <a:schemeClr val="accent5"/>
     </dgm:linClrLst>
     <dgm:effectClrLst/>
     <dgm:txLinClrLst/>
@@ -952,7 +815,7 @@
       </a:schemeClr>
     </dgm:fillClrLst>
     <dgm:linClrLst>
-      <a:schemeClr val="accent3"/>
+      <a:schemeClr val="accent6"/>
     </dgm:linClrLst>
     <dgm:effectClrLst/>
     <dgm:txLinClrLst/>
@@ -968,7 +831,7 @@
       </a:schemeClr>
     </dgm:fillClrLst>
     <dgm:linClrLst>
-      <a:schemeClr val="accent4"/>
+      <a:schemeClr val="accent1"/>
     </dgm:linClrLst>
     <dgm:effectClrLst/>
     <dgm:txLinClrLst/>
@@ -979,7 +842,7 @@
   </dgm:styleLbl>
   <dgm:styleLbl name="bgShp">
     <dgm:fillClrLst meth="repeat">
-      <a:schemeClr val="accent2">
+      <a:schemeClr val="accent4">
         <a:tint val="40000"/>
       </a:schemeClr>
     </dgm:fillClrLst>
@@ -995,7 +858,7 @@
   </dgm:styleLbl>
   <dgm:styleLbl name="dkBgShp">
     <dgm:fillClrLst meth="repeat">
-      <a:schemeClr val="accent2">
+      <a:schemeClr val="accent4">
         <a:shade val="90000"/>
       </a:schemeClr>
     </dgm:fillClrLst>
@@ -1011,13 +874,13 @@
   </dgm:styleLbl>
   <dgm:styleLbl name="trBgShp">
     <dgm:fillClrLst meth="repeat">
-      <a:schemeClr val="accent1">
+      <a:schemeClr val="accent4">
         <a:tint val="50000"/>
         <a:alpha val="40000"/>
       </a:schemeClr>
     </dgm:fillClrLst>
     <dgm:linClrLst meth="repeat">
-      <a:schemeClr val="accent2"/>
+      <a:schemeClr val="accent4"/>
     </dgm:linClrLst>
     <dgm:effectClrLst/>
     <dgm:txLinClrLst/>
@@ -1028,7 +891,7 @@
   </dgm:styleLbl>
   <dgm:styleLbl name="fgShp">
     <dgm:fillClrLst meth="repeat">
-      <a:schemeClr val="accent2">
+      <a:schemeClr val="accent4">
         <a:tint val="40000"/>
       </a:schemeClr>
     </dgm:fillClrLst>
@@ -1067,7 +930,7 @@
 <dgm:dataModel xmlns:dgm="http://schemas.openxmlformats.org/drawingml/2006/diagram" xmlns:a="http://schemas.openxmlformats.org/drawingml/2006/main">
   <dgm:ptLst>
     <dgm:pt modelId="{D266CC46-E7E9-45EA-A3A8-EA6B528A9902}" type="doc">
-      <dgm:prSet loTypeId="urn:microsoft.com/office/officeart/2005/8/layout/hierarchy3" loCatId="hierarchy" qsTypeId="urn:microsoft.com/office/officeart/2005/8/quickstyle/simple1" qsCatId="simple" csTypeId="urn:microsoft.com/office/officeart/2005/8/colors/colorful1" csCatId="colorful" phldr="1"/>
+      <dgm:prSet loTypeId="urn:microsoft.com/office/officeart/2005/8/layout/hierarchy3" loCatId="hierarchy" qsTypeId="urn:microsoft.com/office/officeart/2005/8/quickstyle/simple1" qsCatId="simple" csTypeId="urn:microsoft.com/office/officeart/2005/8/colors/colorful4" csCatId="colorful" phldr="1"/>
       <dgm:spPr/>
       <dgm:t>
         <a:bodyPr/>
@@ -1255,7 +1118,7 @@
           </a:avLst>
         </a:prstGeom>
         <a:solidFill>
-          <a:schemeClr val="accent2">
+          <a:schemeClr val="accent4">
             <a:hueOff val="0"/>
             <a:satOff val="0"/>
             <a:lumOff val="0"/>
@@ -1335,10 +1198,10 @@
           </a:avLst>
         </a:prstGeom>
         <a:solidFill>
-          <a:schemeClr val="accent3">
-            <a:hueOff val="0"/>
-            <a:satOff val="0"/>
-            <a:lumOff val="0"/>
+          <a:schemeClr val="accent4">
+            <a:hueOff val="9800891"/>
+            <a:satOff val="-40777"/>
+            <a:lumOff val="9608"/>
             <a:alphaOff val="0"/>
           </a:schemeClr>
         </a:solidFill>
@@ -2811,7 +2674,7 @@
           <a:p>
             <a:fld id="{8CE69F93-09CF-4A99-B5EE-188DFBA6AEAC}" type="datetimeFigureOut">
               <a:rPr lang="zh-TW" altLang="en-US" smtClean="0"/>
-              <a:t>2020/8/31</a:t>
+              <a:t>2020/9/1</a:t>
             </a:fld>
             <a:endParaRPr lang="zh-TW" altLang="en-US"/>
           </a:p>
@@ -3143,6 +3006,90 @@
           <a:p>
             <a:fld id="{3E76972A-216F-4774-BD33-9DD9F2EEB553}" type="slidenum">
               <a:rPr lang="zh-TW" altLang="en-US" smtClean="0"/>
+              <a:t>4</a:t>
+            </a:fld>
+            <a:endParaRPr lang="zh-TW" altLang="en-US"/>
+          </a:p>
+        </p:txBody>
+      </p:sp>
+    </p:spTree>
+    <p:extLst>
+      <p:ext uri="{BB962C8B-B14F-4D97-AF65-F5344CB8AC3E}">
+        <p14:creationId xmlns:p14="http://schemas.microsoft.com/office/powerpoint/2010/main" val="2768395414"/>
+      </p:ext>
+    </p:extLst>
+  </p:cSld>
+  <p:clrMapOvr>
+    <a:masterClrMapping/>
+  </p:clrMapOvr>
+</p:notes>
+</file>
+
+<file path=ppt/notesSlides/notesSlide2.xml><?xml version="1.0" encoding="utf-8"?>
+<p:notes xmlns:a="http://schemas.openxmlformats.org/drawingml/2006/main" xmlns:r="http://schemas.openxmlformats.org/officeDocument/2006/relationships" xmlns:p="http://schemas.openxmlformats.org/presentationml/2006/main">
+  <p:cSld>
+    <p:spTree>
+      <p:nvGrpSpPr>
+        <p:cNvPr id="1" name=""/>
+        <p:cNvGrpSpPr/>
+        <p:nvPr/>
+      </p:nvGrpSpPr>
+      <p:grpSpPr>
+        <a:xfrm>
+          <a:off x="0" y="0"/>
+          <a:ext cx="0" cy="0"/>
+          <a:chOff x="0" y="0"/>
+          <a:chExt cx="0" cy="0"/>
+        </a:xfrm>
+      </p:grpSpPr>
+      <p:sp>
+        <p:nvSpPr>
+          <p:cNvPr id="2" name="投影片影像版面配置區 1"/>
+          <p:cNvSpPr>
+            <a:spLocks noGrp="1" noRot="1" noChangeAspect="1"/>
+          </p:cNvSpPr>
+          <p:nvPr>
+            <p:ph type="sldImg"/>
+          </p:nvPr>
+        </p:nvSpPr>
+        <p:spPr/>
+      </p:sp>
+      <p:sp>
+        <p:nvSpPr>
+          <p:cNvPr id="3" name="備忘稿版面配置區 2"/>
+          <p:cNvSpPr>
+            <a:spLocks noGrp="1"/>
+          </p:cNvSpPr>
+          <p:nvPr>
+            <p:ph type="body" idx="1"/>
+          </p:nvPr>
+        </p:nvSpPr>
+        <p:spPr/>
+        <p:txBody>
+          <a:bodyPr/>
+          <a:lstStyle/>
+          <a:p>
+            <a:endParaRPr lang="zh-TW" altLang="en-US" dirty="0"/>
+          </a:p>
+        </p:txBody>
+      </p:sp>
+      <p:sp>
+        <p:nvSpPr>
+          <p:cNvPr id="4" name="投影片編號版面配置區 3"/>
+          <p:cNvSpPr>
+            <a:spLocks noGrp="1"/>
+          </p:cNvSpPr>
+          <p:nvPr>
+            <p:ph type="sldNum" sz="quarter" idx="5"/>
+          </p:nvPr>
+        </p:nvSpPr>
+        <p:spPr/>
+        <p:txBody>
+          <a:bodyPr/>
+          <a:lstStyle/>
+          <a:p>
+            <a:fld id="{3E76972A-216F-4774-BD33-9DD9F2EEB553}" type="slidenum">
+              <a:rPr lang="zh-TW" altLang="en-US" smtClean="0"/>
               <a:t>5</a:t>
             </a:fld>
             <a:endParaRPr lang="zh-TW" altLang="en-US"/>
@@ -3309,7 +3256,7 @@
           <a:p>
             <a:fld id="{D5610340-3F96-43BE-A4F3-61D9247F5476}" type="datetime1">
               <a:rPr lang="zh-TW" altLang="en-US" smtClean="0"/>
-              <a:t>2020/8/31</a:t>
+              <a:t>2020/9/1</a:t>
             </a:fld>
             <a:endParaRPr lang="zh-TW" altLang="en-US"/>
           </a:p>
@@ -3507,7 +3454,7 @@
           <a:p>
             <a:fld id="{58D29C5A-B0D4-4831-B164-4FD53F08C79A}" type="datetime1">
               <a:rPr lang="zh-TW" altLang="en-US" smtClean="0"/>
-              <a:t>2020/8/31</a:t>
+              <a:t>2020/9/1</a:t>
             </a:fld>
             <a:endParaRPr lang="zh-TW" altLang="en-US"/>
           </a:p>
@@ -3715,7 +3662,7 @@
           <a:p>
             <a:fld id="{DE6AF697-F838-4EE6-84BA-39CEE2899CE8}" type="datetime1">
               <a:rPr lang="zh-TW" altLang="en-US" smtClean="0"/>
-              <a:t>2020/8/31</a:t>
+              <a:t>2020/9/1</a:t>
             </a:fld>
             <a:endParaRPr lang="zh-TW" altLang="en-US"/>
           </a:p>
@@ -3913,7 +3860,7 @@
           <a:p>
             <a:fld id="{AEAEE1E2-CF64-4CF0-B207-4B3A5C163F8B}" type="datetime1">
               <a:rPr lang="zh-TW" altLang="en-US" smtClean="0"/>
-              <a:t>2020/8/31</a:t>
+              <a:t>2020/9/1</a:t>
             </a:fld>
             <a:endParaRPr lang="zh-TW" altLang="en-US"/>
           </a:p>
@@ -4188,7 +4135,7 @@
           <a:p>
             <a:fld id="{64C52AB5-D0E5-48C8-A999-BD2982C8BD23}" type="datetime1">
               <a:rPr lang="zh-TW" altLang="en-US" smtClean="0"/>
-              <a:t>2020/8/31</a:t>
+              <a:t>2020/9/1</a:t>
             </a:fld>
             <a:endParaRPr lang="zh-TW" altLang="en-US"/>
           </a:p>
@@ -4453,7 +4400,7 @@
           <a:p>
             <a:fld id="{9A91A340-A6F2-4E81-8A00-7B8BEC8962B1}" type="datetime1">
               <a:rPr lang="zh-TW" altLang="en-US" smtClean="0"/>
-              <a:t>2020/8/31</a:t>
+              <a:t>2020/9/1</a:t>
             </a:fld>
             <a:endParaRPr lang="zh-TW" altLang="en-US"/>
           </a:p>
@@ -4865,7 +4812,7 @@
           <a:p>
             <a:fld id="{9D968D3C-6527-430F-B82A-EC1F06295648}" type="datetime1">
               <a:rPr lang="zh-TW" altLang="en-US" smtClean="0"/>
-              <a:t>2020/8/31</a:t>
+              <a:t>2020/9/1</a:t>
             </a:fld>
             <a:endParaRPr lang="zh-TW" altLang="en-US"/>
           </a:p>
@@ -5006,7 +4953,7 @@
           <a:p>
             <a:fld id="{0B68C64E-2C82-469E-A550-4DCDC393D78A}" type="datetime1">
               <a:rPr lang="zh-TW" altLang="en-US" smtClean="0"/>
-              <a:t>2020/8/31</a:t>
+              <a:t>2020/9/1</a:t>
             </a:fld>
             <a:endParaRPr lang="zh-TW" altLang="en-US"/>
           </a:p>
@@ -5119,7 +5066,7 @@
           <a:p>
             <a:fld id="{D8A70ABE-03DA-4106-A2AB-E70BF388A107}" type="datetime1">
               <a:rPr lang="zh-TW" altLang="en-US" smtClean="0"/>
-              <a:t>2020/8/31</a:t>
+              <a:t>2020/9/1</a:t>
             </a:fld>
             <a:endParaRPr lang="zh-TW" altLang="en-US"/>
           </a:p>
@@ -5430,7 +5377,7 @@
           <a:p>
             <a:fld id="{3C62F4D0-F3DF-4B67-ABFA-149393E508C8}" type="datetime1">
               <a:rPr lang="zh-TW" altLang="en-US" smtClean="0"/>
-              <a:t>2020/8/31</a:t>
+              <a:t>2020/9/1</a:t>
             </a:fld>
             <a:endParaRPr lang="zh-TW" altLang="en-US"/>
           </a:p>
@@ -5718,7 +5665,7 @@
           <a:p>
             <a:fld id="{0EF09D13-EE96-45EA-A925-1CF05D21E388}" type="datetime1">
               <a:rPr lang="zh-TW" altLang="en-US" smtClean="0"/>
-              <a:t>2020/8/31</a:t>
+              <a:t>2020/9/1</a:t>
             </a:fld>
             <a:endParaRPr lang="zh-TW" altLang="en-US"/>
           </a:p>
@@ -5959,7 +5906,7 @@
           <a:p>
             <a:fld id="{74BCE80A-B1C1-4699-B6DD-9011C616E11A}" type="datetime1">
               <a:rPr lang="zh-TW" altLang="en-US" smtClean="0"/>
-              <a:t>2020/8/31</a:t>
+              <a:t>2020/9/1</a:t>
             </a:fld>
             <a:endParaRPr lang="zh-TW" altLang="en-US"/>
           </a:p>
@@ -6387,10 +6334,10 @@
       </p:grpSpPr>
       <p:sp>
         <p:nvSpPr>
-          <p:cNvPr id="8" name="Rectangle 7">
-            <a:extLst>
-              <a:ext uri="{FF2B5EF4-FFF2-40B4-BE49-F238E27FC236}">
-                <a16:creationId xmlns:a16="http://schemas.microsoft.com/office/drawing/2014/main" id="{FB5B0058-AF13-4859-B429-4EDDE2A26F7F}"/>
+          <p:cNvPr id="17" name="Rectangle 16">
+            <a:extLst>
+              <a:ext uri="{FF2B5EF4-FFF2-40B4-BE49-F238E27FC236}">
+                <a16:creationId xmlns:a16="http://schemas.microsoft.com/office/drawing/2014/main" id="{23962611-DFD5-4092-AAFD-559E3DFCE2C9}"/>
               </a:ext>
               <a:ext uri="{C183D7F6-B498-43B3-948B-1728B52AA6E4}">
                 <adec:decorative xmlns:adec="http://schemas.microsoft.com/office/drawing/2017/decorative" val="1"/>
@@ -6410,18 +6357,37 @@
         </p:nvSpPr>
         <p:spPr>
           <a:xfrm>
-            <a:off x="0" y="0"/>
-            <a:ext cx="12192000" cy="6858000"/>
+            <a:off x="475488" y="0"/>
+            <a:ext cx="10910292" cy="6858000"/>
           </a:xfrm>
           <a:prstGeom prst="rect">
             <a:avLst/>
           </a:prstGeom>
-          <a:solidFill>
-            <a:schemeClr val="tx1">
-              <a:lumMod val="95000"/>
-              <a:lumOff val="5000"/>
-            </a:schemeClr>
-          </a:solidFill>
+          <a:gradFill>
+            <a:gsLst>
+              <a:gs pos="0">
+                <a:schemeClr val="accent1">
+                  <a:lumMod val="90000"/>
+                </a:schemeClr>
+              </a:gs>
+              <a:gs pos="25000">
+                <a:schemeClr val="accent1">
+                  <a:lumMod val="90000"/>
+                </a:schemeClr>
+              </a:gs>
+              <a:gs pos="94000">
+                <a:schemeClr val="bg2">
+                  <a:lumMod val="25000"/>
+                </a:schemeClr>
+              </a:gs>
+              <a:gs pos="100000">
+                <a:schemeClr val="bg2">
+                  <a:lumMod val="25000"/>
+                </a:schemeClr>
+              </a:gs>
+            </a:gsLst>
+            <a:lin ang="4200000" scaled="0"/>
+          </a:gradFill>
           <a:ln>
             <a:noFill/>
           </a:ln>
@@ -6447,16 +6413,55 @@
           <a:lstStyle/>
           <a:p>
             <a:pPr algn="ctr"/>
-            <a:endParaRPr lang="en-US" dirty="0">
-              <a:solidFill>
-                <a:schemeClr val="bg1">
-                  <a:lumMod val="50000"/>
-                </a:schemeClr>
-              </a:solidFill>
-            </a:endParaRPr>
+            <a:endParaRPr lang="en-US"/>
           </a:p>
         </p:txBody>
       </p:sp>
+      <p:pic>
+        <p:nvPicPr>
+          <p:cNvPr id="19" name="Picture 18">
+            <a:extLst>
+              <a:ext uri="{FF2B5EF4-FFF2-40B4-BE49-F238E27FC236}">
+                <a16:creationId xmlns:a16="http://schemas.microsoft.com/office/drawing/2014/main" id="{2270F1FA-0425-408F-9861-80BF5AFB276D}"/>
+              </a:ext>
+              <a:ext uri="{C183D7F6-B498-43B3-948B-1728B52AA6E4}">
+                <adec:decorative xmlns:adec="http://schemas.microsoft.com/office/drawing/2017/decorative" val="1"/>
+              </a:ext>
+            </a:extLst>
+          </p:cNvPr>
+          <p:cNvPicPr>
+            <a:picLocks noGrp="1" noRot="1" noChangeAspect="1" noMove="1" noResize="1" noEditPoints="1" noAdjustHandles="1" noChangeArrowheads="1" noChangeShapeType="1" noCrop="1"/>
+          </p:cNvPicPr>
+          <p:nvPr>
+            <p:extLst>
+              <p:ext uri="{386F3935-93C4-4BCD-93E2-E3B085C9AB24}">
+                <p16:designElem xmlns:p16="http://schemas.microsoft.com/office/powerpoint/2015/main" val="1"/>
+              </p:ext>
+            </p:extLst>
+          </p:nvPr>
+        </p:nvPicPr>
+        <p:blipFill>
+          <a:blip r:embed="rId2">
+            <a:extLst>
+              <a:ext uri="{28A0092B-C50C-407E-A947-70E740481C1C}">
+                <a14:useLocalDpi xmlns:a14="http://schemas.microsoft.com/office/drawing/2010/main" val="0"/>
+              </a:ext>
+            </a:extLst>
+          </a:blip>
+          <a:stretch>
+            <a:fillRect/>
+          </a:stretch>
+        </p:blipFill>
+        <p:spPr>
+          <a:xfrm>
+            <a:off x="0" y="0"/>
+            <a:ext cx="12192000" cy="6858000"/>
+          </a:xfrm>
+          <a:prstGeom prst="rect">
+            <a:avLst/>
+          </a:prstGeom>
+        </p:spPr>
+      </p:pic>
       <p:sp>
         <p:nvSpPr>
           <p:cNvPr id="2" name="標題 1">
@@ -6475,8 +6480,8 @@
         </p:nvSpPr>
         <p:spPr>
           <a:xfrm>
-            <a:off x="1932903" y="949325"/>
-            <a:ext cx="8071706" cy="2387600"/>
+            <a:off x="3045368" y="2043663"/>
+            <a:ext cx="6105194" cy="2031055"/>
           </a:xfrm>
         </p:spPr>
         <p:txBody>
@@ -6485,49 +6490,32 @@
           </a:bodyPr>
           <a:lstStyle/>
           <a:p>
-            <a:pPr algn="l"/>
-            <a:r>
-              <a:rPr lang="en-US" altLang="zh-TW" sz="6600" dirty="0">
+            <a:r>
+              <a:rPr lang="en-US" altLang="zh-TW">
                 <a:solidFill>
-                  <a:schemeClr val="bg1"/>
+                  <a:srgbClr val="FFFFFF"/>
                 </a:solidFill>
               </a:rPr>
-              <a:t>ARC </a:t>
-            </a:r>
-            <a:r>
-              <a:rPr lang="en-US" altLang="zh-TW" sz="6600" dirty="0" err="1">
+              <a:t>ARC IoTDK Lab2</a:t>
+            </a:r>
+            <a:br>
+              <a:rPr lang="en-US" altLang="zh-TW">
                 <a:solidFill>
-                  <a:schemeClr val="bg1"/>
+                  <a:srgbClr val="FFFFFF"/>
                 </a:solidFill>
               </a:rPr>
-              <a:t>IoTDK</a:t>
-            </a:r>
-            <a:r>
-              <a:rPr lang="en-US" altLang="zh-TW" sz="6600" dirty="0">
+            </a:br>
+            <a:r>
+              <a:rPr lang="en-US" altLang="zh-TW">
                 <a:solidFill>
-                  <a:schemeClr val="bg1"/>
+                  <a:srgbClr val="FFFFFF"/>
                 </a:solidFill>
               </a:rPr>
-              <a:t> Lab2</a:t>
-            </a:r>
-            <a:br>
-              <a:rPr lang="en-US" altLang="zh-TW" sz="6600" dirty="0">
-                <a:solidFill>
-                  <a:schemeClr val="bg1"/>
-                </a:solidFill>
-              </a:rPr>
-            </a:br>
-            <a:r>
-              <a:rPr lang="en-US" altLang="zh-TW" sz="6600" dirty="0">
-                <a:solidFill>
-                  <a:schemeClr val="bg1"/>
-                </a:solidFill>
-              </a:rPr>
               <a:t>- TIMER, I2C</a:t>
             </a:r>
-            <a:endParaRPr lang="zh-TW" altLang="en-US" sz="6600" dirty="0">
+            <a:endParaRPr lang="zh-TW" altLang="en-US">
               <a:solidFill>
-                <a:schemeClr val="bg1"/>
+                <a:srgbClr val="FFFFFF"/>
               </a:solidFill>
             </a:endParaRPr>
           </a:p>
@@ -6551,8 +6539,8 @@
         </p:nvSpPr>
         <p:spPr>
           <a:xfrm>
-            <a:off x="1932902" y="3429000"/>
-            <a:ext cx="8071697" cy="1655762"/>
+            <a:off x="3045368" y="4074718"/>
+            <a:ext cx="6105194" cy="682079"/>
           </a:xfrm>
         </p:spPr>
         <p:txBody>
@@ -6561,119 +6549,14 @@
           </a:bodyPr>
           <a:lstStyle/>
           <a:p>
-            <a:pPr algn="l"/>
-            <a:endParaRPr lang="zh-TW" altLang="en-US" sz="3200">
+            <a:endParaRPr lang="zh-TW" altLang="en-US">
               <a:solidFill>
-                <a:schemeClr val="bg1"/>
+                <a:srgbClr val="FFFFFF"/>
               </a:solidFill>
             </a:endParaRPr>
           </a:p>
         </p:txBody>
       </p:sp>
-      <p:cxnSp>
-        <p:nvCxnSpPr>
-          <p:cNvPr id="10" name="Straight Connector 9">
-            <a:extLst>
-              <a:ext uri="{FF2B5EF4-FFF2-40B4-BE49-F238E27FC236}">
-                <a16:creationId xmlns:a16="http://schemas.microsoft.com/office/drawing/2014/main" id="{EC4521DE-248E-440D-AAD6-FD9E7D34B3BF}"/>
-              </a:ext>
-              <a:ext uri="{C183D7F6-B498-43B3-948B-1728B52AA6E4}">
-                <adec:decorative xmlns:adec="http://schemas.microsoft.com/office/drawing/2017/decorative" val="1"/>
-              </a:ext>
-            </a:extLst>
-          </p:cNvPr>
-          <p:cNvCxnSpPr>
-            <a:cxnSpLocks noGrp="1" noRot="1" noChangeAspect="1" noMove="1" noResize="1" noEditPoints="1" noAdjustHandles="1" noChangeArrowheads="1" noChangeShapeType="1"/>
-          </p:cNvCxnSpPr>
-          <p:nvPr>
-            <p:extLst>
-              <p:ext uri="{386F3935-93C4-4BCD-93E2-E3B085C9AB24}">
-                <p16:designElem xmlns:p16="http://schemas.microsoft.com/office/powerpoint/2015/main" val="1"/>
-              </p:ext>
-            </p:extLst>
-          </p:nvPr>
-        </p:nvCxnSpPr>
-        <p:spPr>
-          <a:xfrm>
-            <a:off x="585285" y="0"/>
-            <a:ext cx="0" cy="6858000"/>
-          </a:xfrm>
-          <a:prstGeom prst="line">
-            <a:avLst/>
-          </a:prstGeom>
-          <a:ln w="12700">
-            <a:solidFill>
-              <a:schemeClr val="accent2"/>
-            </a:solidFill>
-          </a:ln>
-        </p:spPr>
-        <p:style>
-          <a:lnRef idx="1">
-            <a:schemeClr val="accent1"/>
-          </a:lnRef>
-          <a:fillRef idx="0">
-            <a:schemeClr val="accent1"/>
-          </a:fillRef>
-          <a:effectRef idx="0">
-            <a:schemeClr val="accent1"/>
-          </a:effectRef>
-          <a:fontRef idx="minor">
-            <a:schemeClr val="tx1"/>
-          </a:fontRef>
-        </p:style>
-      </p:cxnSp>
-      <p:cxnSp>
-        <p:nvCxnSpPr>
-          <p:cNvPr id="12" name="Straight Connector 11">
-            <a:extLst>
-              <a:ext uri="{FF2B5EF4-FFF2-40B4-BE49-F238E27FC236}">
-                <a16:creationId xmlns:a16="http://schemas.microsoft.com/office/drawing/2014/main" id="{442C13FA-4C0F-42D0-9626-5BA6040D8C31}"/>
-              </a:ext>
-              <a:ext uri="{C183D7F6-B498-43B3-948B-1728B52AA6E4}">
-                <adec:decorative xmlns:adec="http://schemas.microsoft.com/office/drawing/2017/decorative" val="1"/>
-              </a:ext>
-            </a:extLst>
-          </p:cNvPr>
-          <p:cNvCxnSpPr>
-            <a:cxnSpLocks noGrp="1" noRot="1" noChangeAspect="1" noMove="1" noResize="1" noEditPoints="1" noAdjustHandles="1" noChangeArrowheads="1" noChangeShapeType="1"/>
-          </p:cNvCxnSpPr>
-          <p:nvPr>
-            <p:extLst>
-              <p:ext uri="{386F3935-93C4-4BCD-93E2-E3B085C9AB24}">
-                <p16:designElem xmlns:p16="http://schemas.microsoft.com/office/powerpoint/2015/main" val="1"/>
-              </p:ext>
-            </p:extLst>
-          </p:nvPr>
-        </p:nvCxnSpPr>
-        <p:spPr>
-          <a:xfrm flipH="1">
-            <a:off x="0" y="6252485"/>
-            <a:ext cx="12192000" cy="0"/>
-          </a:xfrm>
-          <a:prstGeom prst="line">
-            <a:avLst/>
-          </a:prstGeom>
-          <a:ln w="12700">
-            <a:solidFill>
-              <a:schemeClr val="accent2"/>
-            </a:solidFill>
-          </a:ln>
-        </p:spPr>
-        <p:style>
-          <a:lnRef idx="1">
-            <a:schemeClr val="accent1"/>
-          </a:lnRef>
-          <a:fillRef idx="0">
-            <a:schemeClr val="accent1"/>
-          </a:fillRef>
-          <a:effectRef idx="0">
-            <a:schemeClr val="accent1"/>
-          </a:effectRef>
-          <a:fontRef idx="minor">
-            <a:schemeClr val="tx1"/>
-          </a:fontRef>
-        </p:style>
-      </p:cxnSp>
     </p:spTree>
     <p:extLst>
       <p:ext uri="{BB962C8B-B14F-4D97-AF65-F5344CB8AC3E}">
@@ -6693,7 +6576,10 @@
     <p:bg>
       <p:bgPr>
         <a:solidFill>
-          <a:schemeClr val="bg1"/>
+          <a:schemeClr val="accent4">
+            <a:lumMod val="20000"/>
+            <a:lumOff val="80000"/>
+          </a:schemeClr>
         </a:solidFill>
         <a:effectLst/>
       </p:bgPr>
@@ -7467,7 +7353,10 @@
             </a:pathLst>
           </a:custGeom>
           <a:solidFill>
-            <a:srgbClr val="FFFFFF"/>
+            <a:schemeClr val="accent4">
+              <a:lumMod val="20000"/>
+              <a:lumOff val="80000"/>
+            </a:schemeClr>
           </a:solidFill>
           <a:ln>
             <a:noFill/>
@@ -7992,7 +7881,10 @@
     <p:bg>
       <p:bgPr>
         <a:solidFill>
-          <a:schemeClr val="bg1"/>
+          <a:schemeClr val="accent4">
+            <a:lumMod val="20000"/>
+            <a:lumOff val="80000"/>
+          </a:schemeClr>
         </a:solidFill>
         <a:effectLst/>
       </p:bgPr>
@@ -8257,7 +8149,7 @@
                 <a:latin typeface="微軟正黑體" panose="020B0604030504040204" pitchFamily="34" charset="-120"/>
                 <a:ea typeface="微軟正黑體" panose="020B0604030504040204" pitchFamily="34" charset="-120"/>
               </a:rPr>
-              <a:t>內建的計數器</a:t>
+              <a:t>內建的暫存器</a:t>
             </a:r>
             <a:endParaRPr lang="en-US" altLang="zh-TW" dirty="0">
               <a:latin typeface="微軟正黑體" panose="020B0604030504040204" pitchFamily="34" charset="-120"/>
@@ -8314,7 +8206,7 @@
                 <a:latin typeface="微軟正黑體" panose="020B0604030504040204" pitchFamily="34" charset="-120"/>
                 <a:ea typeface="微軟正黑體" panose="020B0604030504040204" pitchFamily="34" charset="-120"/>
               </a:rPr>
-              <a:t>可以選擇在到達上限後給予</a:t>
+              <a:t>可以選擇在到達某數值後給予</a:t>
             </a:r>
             <a:r>
               <a:rPr lang="en-US" altLang="zh-TW" dirty="0">
@@ -8718,6 +8610,17 @@
 <file path=ppt/slides/slide12.xml><?xml version="1.0" encoding="utf-8"?>
 <p:sld xmlns:a="http://schemas.openxmlformats.org/drawingml/2006/main" xmlns:r="http://schemas.openxmlformats.org/officeDocument/2006/relationships" xmlns:p="http://schemas.openxmlformats.org/presentationml/2006/main">
   <p:cSld>
+    <p:bg>
+      <p:bgPr>
+        <a:solidFill>
+          <a:schemeClr val="accent4">
+            <a:lumMod val="20000"/>
+            <a:lumOff val="80000"/>
+          </a:schemeClr>
+        </a:solidFill>
+        <a:effectLst/>
+      </p:bgPr>
+    </p:bg>
     <p:spTree>
       <p:nvGrpSpPr>
         <p:cNvPr id="1" name=""/>
@@ -9110,6 +9013,17 @@
 <file path=ppt/slides/slide13.xml><?xml version="1.0" encoding="utf-8"?>
 <p:sld xmlns:a="http://schemas.openxmlformats.org/drawingml/2006/main" xmlns:r="http://schemas.openxmlformats.org/officeDocument/2006/relationships" xmlns:p="http://schemas.openxmlformats.org/presentationml/2006/main">
   <p:cSld>
+    <p:bg>
+      <p:bgPr>
+        <a:solidFill>
+          <a:schemeClr val="accent4">
+            <a:lumMod val="20000"/>
+            <a:lumOff val="80000"/>
+          </a:schemeClr>
+        </a:solidFill>
+        <a:effectLst/>
+      </p:bgPr>
+    </p:bg>
     <p:spTree>
       <p:nvGrpSpPr>
         <p:cNvPr id="1" name=""/>
@@ -9311,6 +9225,17 @@
 <file path=ppt/slides/slide14.xml><?xml version="1.0" encoding="utf-8"?>
 <p:sld xmlns:a="http://schemas.openxmlformats.org/drawingml/2006/main" xmlns:r="http://schemas.openxmlformats.org/officeDocument/2006/relationships" xmlns:p="http://schemas.openxmlformats.org/presentationml/2006/main">
   <p:cSld>
+    <p:bg>
+      <p:bgPr>
+        <a:solidFill>
+          <a:schemeClr val="accent4">
+            <a:lumMod val="20000"/>
+            <a:lumOff val="80000"/>
+          </a:schemeClr>
+        </a:solidFill>
+        <a:effectLst/>
+      </p:bgPr>
+    </p:bg>
     <p:spTree>
       <p:nvGrpSpPr>
         <p:cNvPr id="1" name=""/>
@@ -9450,7 +9375,10 @@
     <p:bg>
       <p:bgPr>
         <a:solidFill>
-          <a:schemeClr val="bg1"/>
+          <a:schemeClr val="accent4">
+            <a:lumMod val="20000"/>
+            <a:lumOff val="80000"/>
+          </a:schemeClr>
         </a:solidFill>
         <a:effectLst/>
       </p:bgPr>
@@ -11157,6 +11085,17 @@
 <file path=ppt/slides/slide16.xml><?xml version="1.0" encoding="utf-8"?>
 <p:sld xmlns:a="http://schemas.openxmlformats.org/drawingml/2006/main" xmlns:r="http://schemas.openxmlformats.org/officeDocument/2006/relationships" xmlns:p="http://schemas.openxmlformats.org/presentationml/2006/main">
   <p:cSld>
+    <p:bg>
+      <p:bgPr>
+        <a:solidFill>
+          <a:schemeClr val="accent4">
+            <a:lumMod val="20000"/>
+            <a:lumOff val="80000"/>
+          </a:schemeClr>
+        </a:solidFill>
+        <a:effectLst/>
+      </p:bgPr>
+    </p:bg>
     <p:spTree>
       <p:nvGrpSpPr>
         <p:cNvPr id="1" name=""/>
@@ -11455,6 +11394,17 @@
 <file path=ppt/slides/slide17.xml><?xml version="1.0" encoding="utf-8"?>
 <p:sld xmlns:a="http://schemas.openxmlformats.org/drawingml/2006/main" xmlns:r="http://schemas.openxmlformats.org/officeDocument/2006/relationships" xmlns:p="http://schemas.openxmlformats.org/presentationml/2006/main">
   <p:cSld>
+    <p:bg>
+      <p:bgPr>
+        <a:solidFill>
+          <a:schemeClr val="accent4">
+            <a:lumMod val="20000"/>
+            <a:lumOff val="80000"/>
+          </a:schemeClr>
+        </a:solidFill>
+        <a:effectLst/>
+      </p:bgPr>
+    </p:bg>
     <p:spTree>
       <p:nvGrpSpPr>
         <p:cNvPr id="1" name=""/>
@@ -11696,6 +11646,17 @@
 <file path=ppt/slides/slide18.xml><?xml version="1.0" encoding="utf-8"?>
 <p:sld xmlns:a="http://schemas.openxmlformats.org/drawingml/2006/main" xmlns:r="http://schemas.openxmlformats.org/officeDocument/2006/relationships" xmlns:p="http://schemas.openxmlformats.org/presentationml/2006/main">
   <p:cSld>
+    <p:bg>
+      <p:bgPr>
+        <a:solidFill>
+          <a:schemeClr val="accent4">
+            <a:lumMod val="20000"/>
+            <a:lumOff val="80000"/>
+          </a:schemeClr>
+        </a:solidFill>
+        <a:effectLst/>
+      </p:bgPr>
+    </p:bg>
     <p:spTree>
       <p:nvGrpSpPr>
         <p:cNvPr id="1" name=""/>
@@ -11989,6 +11950,17 @@
 <file path=ppt/slides/slide19.xml><?xml version="1.0" encoding="utf-8"?>
 <p:sld xmlns:a="http://schemas.openxmlformats.org/drawingml/2006/main" xmlns:r="http://schemas.openxmlformats.org/officeDocument/2006/relationships" xmlns:p="http://schemas.openxmlformats.org/presentationml/2006/main">
   <p:cSld>
+    <p:bg>
+      <p:bgPr>
+        <a:solidFill>
+          <a:schemeClr val="accent4">
+            <a:lumMod val="20000"/>
+            <a:lumOff val="80000"/>
+          </a:schemeClr>
+        </a:solidFill>
+        <a:effectLst/>
+      </p:bgPr>
+    </p:bg>
     <p:spTree>
       <p:nvGrpSpPr>
         <p:cNvPr id="1" name=""/>
@@ -12402,7 +12374,7 @@
             <p:ph idx="1"/>
             <p:extLst>
               <p:ext uri="{D42A27DB-BD31-4B8C-83A1-F6EECF244321}">
-                <p14:modId xmlns:p14="http://schemas.microsoft.com/office/powerpoint/2010/main" val="2645899219"/>
+                <p14:modId xmlns:p14="http://schemas.microsoft.com/office/powerpoint/2010/main" val="2542846593"/>
               </p:ext>
             </p:extLst>
           </p:nvPr>
@@ -12433,6 +12405,17 @@
 <file path=ppt/slides/slide20.xml><?xml version="1.0" encoding="utf-8"?>
 <p:sld xmlns:a="http://schemas.openxmlformats.org/drawingml/2006/main" xmlns:r="http://schemas.openxmlformats.org/officeDocument/2006/relationships" xmlns:p="http://schemas.openxmlformats.org/presentationml/2006/main">
   <p:cSld>
+    <p:bg>
+      <p:bgPr>
+        <a:solidFill>
+          <a:schemeClr val="accent4">
+            <a:lumMod val="20000"/>
+            <a:lumOff val="80000"/>
+          </a:schemeClr>
+        </a:solidFill>
+        <a:effectLst/>
+      </p:bgPr>
+    </p:bg>
     <p:spTree>
       <p:nvGrpSpPr>
         <p:cNvPr id="1" name=""/>
@@ -12654,6 +12637,17 @@
 <file path=ppt/slides/slide21.xml><?xml version="1.0" encoding="utf-8"?>
 <p:sld xmlns:a="http://schemas.openxmlformats.org/drawingml/2006/main" xmlns:r="http://schemas.openxmlformats.org/officeDocument/2006/relationships" xmlns:p="http://schemas.openxmlformats.org/presentationml/2006/main">
   <p:cSld>
+    <p:bg>
+      <p:bgPr>
+        <a:solidFill>
+          <a:schemeClr val="accent4">
+            <a:lumMod val="20000"/>
+            <a:lumOff val="80000"/>
+          </a:schemeClr>
+        </a:solidFill>
+        <a:effectLst/>
+      </p:bgPr>
+    </p:bg>
     <p:spTree>
       <p:nvGrpSpPr>
         <p:cNvPr id="1" name=""/>
@@ -12994,7 +12988,10 @@
     <p:bg>
       <p:bgPr>
         <a:solidFill>
-          <a:schemeClr val="bg1"/>
+          <a:schemeClr val="accent4">
+            <a:lumMod val="20000"/>
+            <a:lumOff val="80000"/>
+          </a:schemeClr>
         </a:solidFill>
         <a:effectLst/>
       </p:bgPr>
@@ -14659,6 +14656,17 @@
 <file path=ppt/slides/slide23.xml><?xml version="1.0" encoding="utf-8"?>
 <p:sld xmlns:a="http://schemas.openxmlformats.org/drawingml/2006/main" xmlns:r="http://schemas.openxmlformats.org/officeDocument/2006/relationships" xmlns:p="http://schemas.openxmlformats.org/presentationml/2006/main">
   <p:cSld>
+    <p:bg>
+      <p:bgPr>
+        <a:solidFill>
+          <a:schemeClr val="accent4">
+            <a:lumMod val="20000"/>
+            <a:lumOff val="80000"/>
+          </a:schemeClr>
+        </a:solidFill>
+        <a:effectLst/>
+      </p:bgPr>
+    </p:bg>
     <p:spTree>
       <p:nvGrpSpPr>
         <p:cNvPr id="1" name=""/>
@@ -15077,6 +15085,17 @@
 <file path=ppt/slides/slide24.xml><?xml version="1.0" encoding="utf-8"?>
 <p:sld xmlns:a="http://schemas.openxmlformats.org/drawingml/2006/main" xmlns:r="http://schemas.openxmlformats.org/officeDocument/2006/relationships" xmlns:p="http://schemas.openxmlformats.org/presentationml/2006/main">
   <p:cSld>
+    <p:bg>
+      <p:bgPr>
+        <a:solidFill>
+          <a:schemeClr val="accent4">
+            <a:lumMod val="20000"/>
+            <a:lumOff val="80000"/>
+          </a:schemeClr>
+        </a:solidFill>
+        <a:effectLst/>
+      </p:bgPr>
+    </p:bg>
     <p:spTree>
       <p:nvGrpSpPr>
         <p:cNvPr id="1" name=""/>
@@ -15539,6 +15558,17 @@
 <file path=ppt/slides/slide25.xml><?xml version="1.0" encoding="utf-8"?>
 <p:sld xmlns:a="http://schemas.openxmlformats.org/drawingml/2006/main" xmlns:r="http://schemas.openxmlformats.org/officeDocument/2006/relationships" xmlns:p="http://schemas.openxmlformats.org/presentationml/2006/main">
   <p:cSld>
+    <p:bg>
+      <p:bgPr>
+        <a:solidFill>
+          <a:schemeClr val="accent4">
+            <a:lumMod val="20000"/>
+            <a:lumOff val="80000"/>
+          </a:schemeClr>
+        </a:solidFill>
+        <a:effectLst/>
+      </p:bgPr>
+    </p:bg>
     <p:spTree>
       <p:nvGrpSpPr>
         <p:cNvPr id="1" name=""/>
@@ -15946,6 +15976,17 @@
 <file path=ppt/slides/slide26.xml><?xml version="1.0" encoding="utf-8"?>
 <p:sld xmlns:a="http://schemas.openxmlformats.org/drawingml/2006/main" xmlns:r="http://schemas.openxmlformats.org/officeDocument/2006/relationships" xmlns:p="http://schemas.openxmlformats.org/presentationml/2006/main">
   <p:cSld>
+    <p:bg>
+      <p:bgPr>
+        <a:solidFill>
+          <a:schemeClr val="accent4">
+            <a:lumMod val="20000"/>
+            <a:lumOff val="80000"/>
+          </a:schemeClr>
+        </a:solidFill>
+        <a:effectLst/>
+      </p:bgPr>
+    </p:bg>
     <p:spTree>
       <p:nvGrpSpPr>
         <p:cNvPr id="1" name=""/>
@@ -16452,6 +16493,17 @@
 <file path=ppt/slides/slide27.xml><?xml version="1.0" encoding="utf-8"?>
 <p:sld xmlns:a="http://schemas.openxmlformats.org/drawingml/2006/main" xmlns:r="http://schemas.openxmlformats.org/officeDocument/2006/relationships" xmlns:p="http://schemas.openxmlformats.org/presentationml/2006/main">
   <p:cSld>
+    <p:bg>
+      <p:bgPr>
+        <a:solidFill>
+          <a:schemeClr val="accent4">
+            <a:lumMod val="20000"/>
+            <a:lumOff val="80000"/>
+          </a:schemeClr>
+        </a:solidFill>
+        <a:effectLst/>
+      </p:bgPr>
+    </p:bg>
     <p:spTree>
       <p:nvGrpSpPr>
         <p:cNvPr id="1" name=""/>
@@ -16958,6 +17010,17 @@
 <file path=ppt/slides/slide28.xml><?xml version="1.0" encoding="utf-8"?>
 <p:sld xmlns:a="http://schemas.openxmlformats.org/drawingml/2006/main" xmlns:r="http://schemas.openxmlformats.org/officeDocument/2006/relationships" xmlns:p="http://schemas.openxmlformats.org/presentationml/2006/main">
   <p:cSld>
+    <p:bg>
+      <p:bgPr>
+        <a:solidFill>
+          <a:schemeClr val="accent4">
+            <a:lumMod val="20000"/>
+            <a:lumOff val="80000"/>
+          </a:schemeClr>
+        </a:solidFill>
+        <a:effectLst/>
+      </p:bgPr>
+    </p:bg>
     <p:spTree>
       <p:nvGrpSpPr>
         <p:cNvPr id="1" name=""/>
@@ -17275,6 +17338,17 @@
 <file path=ppt/slides/slide29.xml><?xml version="1.0" encoding="utf-8"?>
 <p:sld xmlns:a="http://schemas.openxmlformats.org/drawingml/2006/main" xmlns:r="http://schemas.openxmlformats.org/officeDocument/2006/relationships" xmlns:p="http://schemas.openxmlformats.org/presentationml/2006/main">
   <p:cSld>
+    <p:bg>
+      <p:bgPr>
+        <a:solidFill>
+          <a:schemeClr val="accent4">
+            <a:lumMod val="20000"/>
+            <a:lumOff val="80000"/>
+          </a:schemeClr>
+        </a:solidFill>
+        <a:effectLst/>
+      </p:bgPr>
+    </p:bg>
     <p:spTree>
       <p:nvGrpSpPr>
         <p:cNvPr id="1" name=""/>
@@ -17632,7 +17706,10 @@
     <p:bg>
       <p:bgPr>
         <a:solidFill>
-          <a:schemeClr val="bg1"/>
+          <a:schemeClr val="accent4">
+            <a:lumMod val="20000"/>
+            <a:lumOff val="80000"/>
+          </a:schemeClr>
         </a:solidFill>
         <a:effectLst/>
       </p:bgPr>
@@ -19119,7 +19196,10 @@
     <p:bg>
       <p:bgPr>
         <a:solidFill>
-          <a:schemeClr val="bg1"/>
+          <a:schemeClr val="accent4">
+            <a:lumMod val="20000"/>
+            <a:lumOff val="80000"/>
+          </a:schemeClr>
         </a:solidFill>
         <a:effectLst/>
       </p:bgPr>
@@ -19235,26 +19315,6 @@
                 <a:ea typeface="微軟正黑體" panose="020B0604030504040204" pitchFamily="34" charset="-120"/>
               </a:rPr>
               <a:t>超音波測距模組</a:t>
-            </a:r>
-            <a:r>
-              <a:rPr lang="en-US" altLang="zh-TW" dirty="0">
-                <a:latin typeface="微軟正黑體" panose="020B0604030504040204" pitchFamily="34" charset="-120"/>
-                <a:ea typeface="微軟正黑體" panose="020B0604030504040204" pitchFamily="34" charset="-120"/>
-              </a:rPr>
-              <a:t>-</a:t>
-            </a:r>
-            <a:br>
-              <a:rPr lang="en-US" altLang="zh-TW" dirty="0">
-                <a:latin typeface="微軟正黑體" panose="020B0604030504040204" pitchFamily="34" charset="-120"/>
-                <a:ea typeface="微軟正黑體" panose="020B0604030504040204" pitchFamily="34" charset="-120"/>
-              </a:rPr>
-            </a:br>
-            <a:r>
-              <a:rPr lang="zh-TW" altLang="en-US" dirty="0">
-                <a:latin typeface="微軟正黑體" panose="020B0604030504040204" pitchFamily="34" charset="-120"/>
-                <a:ea typeface="微軟正黑體" panose="020B0604030504040204" pitchFamily="34" charset="-120"/>
-              </a:rPr>
-              <a:t>外觀</a:t>
             </a:r>
           </a:p>
         </p:txBody>
@@ -19513,12 +19573,49 @@
           </a:bodyPr>
           <a:lstStyle/>
           <a:p>
+            <a:r>
+              <a:rPr lang="zh-TW" altLang="en-US" sz="2000" dirty="0">
+                <a:latin typeface="微軟正黑體" panose="020B0604030504040204" pitchFamily="34" charset="-120"/>
+                <a:ea typeface="微軟正黑體" panose="020B0604030504040204" pitchFamily="34" charset="-120"/>
+              </a:rPr>
+              <a:t>提供測量距離使用</a:t>
+            </a:r>
             <a:endParaRPr lang="en-US" altLang="zh-TW" sz="2000" dirty="0">
               <a:latin typeface="微軟正黑體" panose="020B0604030504040204" pitchFamily="34" charset="-120"/>
               <a:ea typeface="微軟正黑體" panose="020B0604030504040204" pitchFamily="34" charset="-120"/>
             </a:endParaRPr>
           </a:p>
           <a:p>
+            <a:r>
+              <a:rPr lang="zh-TW" altLang="en-US" sz="2000" dirty="0">
+                <a:latin typeface="微軟正黑體" panose="020B0604030504040204" pitchFamily="34" charset="-120"/>
+                <a:ea typeface="微軟正黑體" panose="020B0604030504040204" pitchFamily="34" charset="-120"/>
+              </a:rPr>
+              <a:t>官方測量範圍：</a:t>
+            </a:r>
+            <a:r>
+              <a:rPr lang="en-US" altLang="zh-TW" sz="2000" dirty="0">
+                <a:latin typeface="微軟正黑體" panose="020B0604030504040204" pitchFamily="34" charset="-120"/>
+                <a:ea typeface="微軟正黑體" panose="020B0604030504040204" pitchFamily="34" charset="-120"/>
+              </a:rPr>
+              <a:t>3cm~350cm</a:t>
+            </a:r>
+          </a:p>
+          <a:p>
+            <a:r>
+              <a:rPr lang="zh-TW" altLang="en-US" sz="2000" dirty="0">
+                <a:latin typeface="微軟正黑體" panose="020B0604030504040204" pitchFamily="34" charset="-120"/>
+                <a:ea typeface="微軟正黑體" panose="020B0604030504040204" pitchFamily="34" charset="-120"/>
+              </a:rPr>
+              <a:t>工作電壓：</a:t>
+            </a:r>
+            <a:r>
+              <a:rPr lang="en-US" altLang="zh-TW" sz="2000" dirty="0">
+                <a:latin typeface="微軟正黑體" panose="020B0604030504040204" pitchFamily="34" charset="-120"/>
+                <a:ea typeface="微軟正黑體" panose="020B0604030504040204" pitchFamily="34" charset="-120"/>
+              </a:rPr>
+              <a:t>3.3V~5V</a:t>
+            </a:r>
             <a:endParaRPr lang="zh-TW" altLang="en-US" sz="2000" dirty="0">
               <a:latin typeface="微軟正黑體" panose="020B0604030504040204" pitchFamily="34" charset="-120"/>
               <a:ea typeface="微軟正黑體" panose="020B0604030504040204" pitchFamily="34" charset="-120"/>
@@ -19680,20 +19777,29 @@
           <p:nvPr/>
         </p:nvPicPr>
         <p:blipFill rotWithShape="1">
-          <a:blip r:embed="rId2">
-            <a:extLst>
+          <a:blip r:embed="rId3">
+            <a:extLst>
+              <a:ext uri="{BEBA8EAE-BF5A-486C-A8C5-ECC9F3942E4B}">
+                <a14:imgProps xmlns:a14="http://schemas.microsoft.com/office/drawing/2010/main">
+                  <a14:imgLayer r:embed="rId4">
+                    <a14:imgEffect>
+                      <a14:backgroundRemoval t="13522" b="90391" l="11432" r="89158"/>
+                    </a14:imgEffect>
+                  </a14:imgLayer>
+                </a14:imgProps>
+              </a:ext>
               <a:ext uri="{28A0092B-C50C-407E-A947-70E740481C1C}">
                 <a14:useLocalDpi xmlns:a14="http://schemas.microsoft.com/office/drawing/2010/main" val="0"/>
               </a:ext>
             </a:extLst>
           </a:blip>
-          <a:srcRect l="11037" t="3913" r="10102" b="-6"/>
+          <a:srcRect l="1717" t="3913" r="1126" b="-6"/>
           <a:stretch/>
         </p:blipFill>
         <p:spPr bwMode="auto">
           <a:xfrm>
-            <a:off x="5873189" y="1004834"/>
-            <a:ext cx="5530009" cy="5053813"/>
+            <a:off x="5283988" y="1083484"/>
+            <a:ext cx="6813010" cy="5053813"/>
           </a:xfrm>
           <a:prstGeom prst="rect">
             <a:avLst/>
@@ -19776,8 +19882,8 @@
         </p:nvSpPr>
         <p:spPr>
           <a:xfrm>
-            <a:off x="7847762" y="6633928"/>
-            <a:ext cx="4344237" cy="369332"/>
+            <a:off x="7283658" y="6674802"/>
+            <a:ext cx="5258539" cy="230832"/>
           </a:xfrm>
           <a:prstGeom prst="rect">
             <a:avLst/>
@@ -19799,7 +19905,7 @@
               <a:rPr lang="en-US" altLang="zh-TW" sz="900" dirty="0">
                 <a:latin typeface="微軟正黑體" panose="020B0604030504040204" pitchFamily="34" charset="-120"/>
                 <a:ea typeface="微軟正黑體" panose="020B0604030504040204" pitchFamily="34" charset="-120"/>
-                <a:hlinkClick r:id="rId3"/>
+                <a:hlinkClick r:id="rId5"/>
               </a:rPr>
               <a:t>https://www.taiwaniot.com.tw/wp-content/uploads/2015/09/101020010-2-600x450.png</a:t>
             </a:r>
@@ -19826,6 +19932,17 @@
 <file path=ppt/slides/slide5.xml><?xml version="1.0" encoding="utf-8"?>
 <p:sld xmlns:a="http://schemas.openxmlformats.org/drawingml/2006/main" xmlns:r="http://schemas.openxmlformats.org/officeDocument/2006/relationships" xmlns:p="http://schemas.openxmlformats.org/presentationml/2006/main">
   <p:cSld>
+    <p:bg>
+      <p:bgPr>
+        <a:solidFill>
+          <a:schemeClr val="accent4">
+            <a:lumMod val="20000"/>
+            <a:lumOff val="80000"/>
+          </a:schemeClr>
+        </a:solidFill>
+        <a:effectLst/>
+      </p:bgPr>
+    </p:bg>
     <p:spTree>
       <p:nvGrpSpPr>
         <p:cNvPr id="1" name=""/>
@@ -19904,6 +20021,15 @@
         <p:blipFill>
           <a:blip r:embed="rId3">
             <a:extLst>
+              <a:ext uri="{BEBA8EAE-BF5A-486C-A8C5-ECC9F3942E4B}">
+                <a14:imgProps xmlns:a14="http://schemas.microsoft.com/office/drawing/2010/main">
+                  <a14:imgLayer r:embed="rId4">
+                    <a14:imgEffect>
+                      <a14:backgroundRemoval t="10000" b="90000" l="10000" r="90000"/>
+                    </a14:imgEffect>
+                  </a14:imgLayer>
+                </a14:imgProps>
+              </a:ext>
               <a:ext uri="{28A0092B-C50C-407E-A947-70E740481C1C}">
                 <a14:useLocalDpi xmlns:a14="http://schemas.microsoft.com/office/drawing/2010/main" val="0"/>
               </a:ext>
@@ -20544,7 +20670,10 @@
     <p:bg>
       <p:bgPr>
         <a:solidFill>
-          <a:schemeClr val="bg1"/>
+          <a:schemeClr val="accent4">
+            <a:lumMod val="20000"/>
+            <a:lumOff val="80000"/>
+          </a:schemeClr>
         </a:solidFill>
         <a:effectLst/>
       </p:bgPr>
@@ -20957,7 +21086,7 @@
             </a:ln>
             <a:extLst>
               <a:ext uri="{C572A759-6A51-4108-AA02-DFA0A04FC94B}">
-                <ma14:wrappingTextBoxFlag xmlns:ma14="http://schemas.microsoft.com/office/mac/drawingml/2011/main" xmlns:a14="http://schemas.microsoft.com/office/drawing/2010/main" xmlns:m="http://schemas.openxmlformats.org/officeDocument/2006/math" xmlns="" val="1"/>
+                <ma14:wrappingTextBoxFlag xmlns="" xmlns:m="http://schemas.openxmlformats.org/officeDocument/2006/math" xmlns:a14="http://schemas.microsoft.com/office/drawing/2010/main" xmlns:ma14="http://schemas.microsoft.com/office/mac/drawingml/2011/main" val="1"/>
               </a:ext>
             </a:extLst>
           </p:spPr>
@@ -21158,7 +21287,7 @@
             </a:ln>
             <a:extLst>
               <a:ext uri="{C572A759-6A51-4108-AA02-DFA0A04FC94B}">
-                <ma14:wrappingTextBoxFlag xmlns:ma14="http://schemas.microsoft.com/office/mac/drawingml/2011/main" xmlns:a14="http://schemas.microsoft.com/office/drawing/2010/main" xmlns:m="http://schemas.openxmlformats.org/officeDocument/2006/math" xmlns="" val="1"/>
+                <ma14:wrappingTextBoxFlag xmlns="" xmlns:m="http://schemas.openxmlformats.org/officeDocument/2006/math" xmlns:a14="http://schemas.microsoft.com/office/drawing/2010/main" xmlns:ma14="http://schemas.microsoft.com/office/mac/drawingml/2011/main" val="1"/>
               </a:ext>
             </a:extLst>
           </p:spPr>
@@ -21215,7 +21344,7 @@
             </a:ln>
             <a:extLst>
               <a:ext uri="{C572A759-6A51-4108-AA02-DFA0A04FC94B}">
-                <ma14:wrappingTextBoxFlag xmlns:ma14="http://schemas.microsoft.com/office/mac/drawingml/2011/main" xmlns:a14="http://schemas.microsoft.com/office/drawing/2010/main" xmlns:m="http://schemas.openxmlformats.org/officeDocument/2006/math" xmlns="" val="1"/>
+                <ma14:wrappingTextBoxFlag xmlns="" xmlns:m="http://schemas.openxmlformats.org/officeDocument/2006/math" xmlns:a14="http://schemas.microsoft.com/office/drawing/2010/main" xmlns:ma14="http://schemas.microsoft.com/office/mac/drawingml/2011/main" val="1"/>
               </a:ext>
             </a:extLst>
           </p:spPr>
@@ -21285,7 +21414,7 @@
             </a:ln>
             <a:extLst>
               <a:ext uri="{C572A759-6A51-4108-AA02-DFA0A04FC94B}">
-                <ma14:wrappingTextBoxFlag xmlns:ma14="http://schemas.microsoft.com/office/mac/drawingml/2011/main" xmlns:a14="http://schemas.microsoft.com/office/drawing/2010/main" xmlns:m="http://schemas.openxmlformats.org/officeDocument/2006/math" xmlns="" val="1"/>
+                <ma14:wrappingTextBoxFlag xmlns="" xmlns:m="http://schemas.openxmlformats.org/officeDocument/2006/math" xmlns:a14="http://schemas.microsoft.com/office/drawing/2010/main" xmlns:ma14="http://schemas.microsoft.com/office/mac/drawingml/2011/main" val="1"/>
               </a:ext>
             </a:extLst>
           </p:spPr>
@@ -21408,7 +21537,10 @@
     <p:bg>
       <p:bgPr>
         <a:solidFill>
-          <a:schemeClr val="bg1"/>
+          <a:schemeClr val="accent4">
+            <a:lumMod val="20000"/>
+            <a:lumOff val="80000"/>
+          </a:schemeClr>
         </a:solidFill>
         <a:effectLst/>
       </p:bgPr>
@@ -22098,7 +22230,7 @@
               </a:ln>
               <a:extLst>
                 <a:ext uri="{C572A759-6A51-4108-AA02-DFA0A04FC94B}">
-                  <ma14:wrappingTextBoxFlag xmlns:ma14="http://schemas.microsoft.com/office/mac/drawingml/2011/main" xmlns:a14="http://schemas.microsoft.com/office/drawing/2010/main" xmlns:m="http://schemas.openxmlformats.org/officeDocument/2006/math" xmlns="" val="1"/>
+                  <ma14:wrappingTextBoxFlag xmlns="" xmlns:m="http://schemas.openxmlformats.org/officeDocument/2006/math" xmlns:a14="http://schemas.microsoft.com/office/drawing/2010/main" xmlns:ma14="http://schemas.microsoft.com/office/mac/drawingml/2011/main" val="1"/>
                 </a:ext>
               </a:extLst>
             </p:spPr>
@@ -22304,7 +22436,7 @@
             </a:ln>
             <a:extLst>
               <a:ext uri="{C572A759-6A51-4108-AA02-DFA0A04FC94B}">
-                <ma14:wrappingTextBoxFlag xmlns="" xmlns:m="http://schemas.openxmlformats.org/officeDocument/2006/math" xmlns:a14="http://schemas.microsoft.com/office/drawing/2010/main" xmlns:ma14="http://schemas.microsoft.com/office/mac/drawingml/2011/main" val="1"/>
+                <ma14:wrappingTextBoxFlag xmlns:ma14="http://schemas.microsoft.com/office/mac/drawingml/2011/main" xmlns:a14="http://schemas.microsoft.com/office/drawing/2010/main" xmlns:m="http://schemas.openxmlformats.org/officeDocument/2006/math" xmlns="" val="1"/>
               </a:ext>
             </a:extLst>
           </p:spPr>
@@ -22361,7 +22493,7 @@
             </a:ln>
             <a:extLst>
               <a:ext uri="{C572A759-6A51-4108-AA02-DFA0A04FC94B}">
-                <ma14:wrappingTextBoxFlag xmlns="" xmlns:m="http://schemas.openxmlformats.org/officeDocument/2006/math" xmlns:a14="http://schemas.microsoft.com/office/drawing/2010/main" xmlns:ma14="http://schemas.microsoft.com/office/mac/drawingml/2011/main" val="1"/>
+                <ma14:wrappingTextBoxFlag xmlns:ma14="http://schemas.microsoft.com/office/mac/drawingml/2011/main" xmlns:a14="http://schemas.microsoft.com/office/drawing/2010/main" xmlns:m="http://schemas.openxmlformats.org/officeDocument/2006/math" xmlns="" val="1"/>
               </a:ext>
             </a:extLst>
           </p:spPr>
@@ -22431,7 +22563,7 @@
             </a:ln>
             <a:extLst>
               <a:ext uri="{C572A759-6A51-4108-AA02-DFA0A04FC94B}">
-                <ma14:wrappingTextBoxFlag xmlns="" xmlns:m="http://schemas.openxmlformats.org/officeDocument/2006/math" xmlns:a14="http://schemas.microsoft.com/office/drawing/2010/main" xmlns:ma14="http://schemas.microsoft.com/office/mac/drawingml/2011/main" val="1"/>
+                <ma14:wrappingTextBoxFlag xmlns:ma14="http://schemas.microsoft.com/office/mac/drawingml/2011/main" xmlns:a14="http://schemas.microsoft.com/office/drawing/2010/main" xmlns:m="http://schemas.openxmlformats.org/officeDocument/2006/math" xmlns="" val="1"/>
               </a:ext>
             </a:extLst>
           </p:spPr>
@@ -22479,6 +22611,17 @@
 <file path=ppt/slides/slide8.xml><?xml version="1.0" encoding="utf-8"?>
 <p:sld xmlns:a="http://schemas.openxmlformats.org/drawingml/2006/main" xmlns:r="http://schemas.openxmlformats.org/officeDocument/2006/relationships" xmlns:p="http://schemas.openxmlformats.org/presentationml/2006/main">
   <p:cSld>
+    <p:bg>
+      <p:bgPr>
+        <a:solidFill>
+          <a:schemeClr val="accent4">
+            <a:lumMod val="20000"/>
+            <a:lumOff val="80000"/>
+          </a:schemeClr>
+        </a:solidFill>
+        <a:effectLst/>
+      </p:bgPr>
+    </p:bg>
     <p:spTree>
       <p:nvGrpSpPr>
         <p:cNvPr id="1" name=""/>
@@ -22990,6 +23133,17 @@
 <file path=ppt/slides/slide9.xml><?xml version="1.0" encoding="utf-8"?>
 <p:sld xmlns:a="http://schemas.openxmlformats.org/drawingml/2006/main" xmlns:r="http://schemas.openxmlformats.org/officeDocument/2006/relationships" xmlns:p="http://schemas.openxmlformats.org/presentationml/2006/main">
   <p:cSld>
+    <p:bg>
+      <p:bgPr>
+        <a:solidFill>
+          <a:schemeClr val="accent4">
+            <a:lumMod val="20000"/>
+            <a:lumOff val="80000"/>
+          </a:schemeClr>
+        </a:solidFill>
+        <a:effectLst/>
+      </p:bgPr>
+    </p:bg>
     <p:spTree>
       <p:nvGrpSpPr>
         <p:cNvPr id="1" name=""/>
@@ -23026,18 +23180,25 @@
           <a:lstStyle/>
           <a:p>
             <a:r>
-              <a:rPr lang="zh-TW" altLang="en-US" dirty="0">
-                <a:latin typeface="微軟正黑體" panose="020B0604030504040204" pitchFamily="34" charset="-120"/>
-                <a:ea typeface="微軟正黑體" panose="020B0604030504040204" pitchFamily="34" charset="-120"/>
-              </a:rPr>
-              <a:t>超音波測距流程圖</a:t>
-            </a:r>
-            <a:r>
-              <a:rPr lang="en-US" altLang="zh-TW" dirty="0">
-                <a:latin typeface="微軟正黑體" panose="020B0604030504040204" pitchFamily="34" charset="-120"/>
-                <a:ea typeface="微軟正黑體" panose="020B0604030504040204" pitchFamily="34" charset="-120"/>
-              </a:rPr>
-              <a:t>(1/2)</a:t>
+              <a:rPr lang="zh-TW" altLang="en-US" sz="4400" dirty="0">
+                <a:latin typeface="微軟正黑體" panose="020B0604030504040204" pitchFamily="34" charset="-120"/>
+                <a:ea typeface="微軟正黑體" panose="020B0604030504040204" pitchFamily="34" charset="-120"/>
+              </a:rPr>
+              <a:t>超音波測距 </a:t>
+            </a:r>
+            <a:r>
+              <a:rPr lang="en-US" altLang="zh-TW" sz="4400" dirty="0">
+                <a:latin typeface="微軟正黑體" panose="020B0604030504040204" pitchFamily="34" charset="-120"/>
+                <a:ea typeface="微軟正黑體" panose="020B0604030504040204" pitchFamily="34" charset="-120"/>
+              </a:rPr>
+              <a:t>–</a:t>
+            </a:r>
+            <a:r>
+              <a:rPr lang="zh-TW" altLang="en-US" sz="4400" dirty="0">
+                <a:latin typeface="微軟正黑體" panose="020B0604030504040204" pitchFamily="34" charset="-120"/>
+                <a:ea typeface="微軟正黑體" panose="020B0604030504040204" pitchFamily="34" charset="-120"/>
+              </a:rPr>
+              <a:t> 實驗目標</a:t>
             </a:r>
             <a:endParaRPr lang="zh-TW" altLang="en-US" dirty="0">
               <a:latin typeface="微軟正黑體" panose="020B0604030504040204" pitchFamily="34" charset="-120"/>

</xml_diff>